<commit_message>
Add final version of poster for printing.
</commit_message>
<xml_diff>
--- a/poster/poster_FINAL.pptx
+++ b/poster/poster_FINAL.pptx
@@ -17783,7 +17783,7 @@
         </p:nvSpPr>
         <p:spPr>
           <a:xfrm>
-            <a:off x="20761328" y="16078200"/>
+            <a:off x="20700714" y="16078200"/>
             <a:ext cx="6400800" cy="838200"/>
           </a:xfrm>
           <a:prstGeom prst="rect">
@@ -17991,7 +17991,7 @@
         </p:nvSpPr>
         <p:spPr>
           <a:xfrm>
-            <a:off x="20779554" y="13106400"/>
+            <a:off x="20718940" y="13106400"/>
             <a:ext cx="6400800" cy="838200"/>
           </a:xfrm>
           <a:prstGeom prst="rect">
@@ -18393,7 +18393,7 @@
         </p:nvSpPr>
         <p:spPr>
           <a:xfrm>
-            <a:off x="20761328" y="16139160"/>
+            <a:off x="20700714" y="16139160"/>
             <a:ext cx="6400800" cy="707886"/>
           </a:xfrm>
           <a:prstGeom prst="rect">
@@ -18557,7 +18557,7 @@
         </p:nvSpPr>
         <p:spPr>
           <a:xfrm>
-            <a:off x="20733254" y="13145274"/>
+            <a:off x="20672640" y="13145274"/>
             <a:ext cx="6400800" cy="707886"/>
           </a:xfrm>
           <a:prstGeom prst="rect">
@@ -18693,8 +18693,8 @@
           </a:p>
         </p:txBody>
       </p:sp>
-      <mc:AlternateContent xmlns:mc="http://schemas.openxmlformats.org/markup-compatibility/2006">
-        <mc:Choice xmlns:a14="http://schemas.microsoft.com/office/drawing/2010/main" Requires="a14">
+      <mc:AlternateContent xmlns:mc="http://schemas.openxmlformats.org/markup-compatibility/2006" xmlns:a14="http://schemas.microsoft.com/office/drawing/2010/main">
+        <mc:Choice Requires="a14">
           <p:sp>
             <p:nvSpPr>
               <p:cNvPr id="143" name="Rectangle 142">
@@ -19049,7 +19049,7 @@
             </p:txBody>
           </p:sp>
         </mc:Choice>
-        <mc:Fallback>
+        <mc:Fallback xmlns="">
           <p:sp>
             <p:nvSpPr>
               <p:cNvPr id="143" name="Rectangle 142">
@@ -19094,8 +19094,8 @@
           </p:sp>
         </mc:Fallback>
       </mc:AlternateContent>
-      <mc:AlternateContent xmlns:mc="http://schemas.openxmlformats.org/markup-compatibility/2006">
-        <mc:Choice xmlns:a14="http://schemas.microsoft.com/office/drawing/2010/main" Requires="a14">
+      <mc:AlternateContent xmlns:mc="http://schemas.openxmlformats.org/markup-compatibility/2006" xmlns:a14="http://schemas.microsoft.com/office/drawing/2010/main">
+        <mc:Choice Requires="a14">
           <p:sp>
             <p:nvSpPr>
               <p:cNvPr id="147" name="Rectangle 146">
@@ -19232,7 +19232,7 @@
             </p:txBody>
           </p:sp>
         </mc:Choice>
-        <mc:Fallback>
+        <mc:Fallback xmlns="">
           <p:sp>
             <p:nvSpPr>
               <p:cNvPr id="147" name="Rectangle 146">
@@ -19277,8 +19277,8 @@
           </p:sp>
         </mc:Fallback>
       </mc:AlternateContent>
-      <mc:AlternateContent xmlns:mc="http://schemas.openxmlformats.org/markup-compatibility/2006">
-        <mc:Choice xmlns:a14="http://schemas.microsoft.com/office/drawing/2010/main" Requires="a14">
+      <mc:AlternateContent xmlns:mc="http://schemas.openxmlformats.org/markup-compatibility/2006" xmlns:a14="http://schemas.microsoft.com/office/drawing/2010/main">
+        <mc:Choice Requires="a14">
           <p:sp>
             <p:nvSpPr>
               <p:cNvPr id="174" name="Rectangle 173">
@@ -19695,7 +19695,7 @@
             </p:txBody>
           </p:sp>
         </mc:Choice>
-        <mc:Fallback>
+        <mc:Fallback xmlns="">
           <p:sp>
             <p:nvSpPr>
               <p:cNvPr id="174" name="Rectangle 173">
@@ -19740,8 +19740,8 @@
           </p:sp>
         </mc:Fallback>
       </mc:AlternateContent>
-      <mc:AlternateContent xmlns:mc="http://schemas.openxmlformats.org/markup-compatibility/2006">
-        <mc:Choice xmlns:a14="http://schemas.microsoft.com/office/drawing/2010/main" Requires="a14">
+      <mc:AlternateContent xmlns:mc="http://schemas.openxmlformats.org/markup-compatibility/2006" xmlns:a14="http://schemas.microsoft.com/office/drawing/2010/main">
+        <mc:Choice Requires="a14">
           <p:sp>
             <p:nvSpPr>
               <p:cNvPr id="175" name="Rectangle 174">
@@ -20175,7 +20175,7 @@
             </p:txBody>
           </p:sp>
         </mc:Choice>
-        <mc:Fallback>
+        <mc:Fallback xmlns="">
           <p:sp>
             <p:nvSpPr>
               <p:cNvPr id="175" name="Rectangle 174">
@@ -20534,7 +20534,7 @@
         </p:nvSpPr>
         <p:spPr>
           <a:xfrm>
-            <a:off x="21022178" y="16992600"/>
+            <a:off x="20961564" y="16992600"/>
             <a:ext cx="5922141" cy="1015663"/>
           </a:xfrm>
           <a:prstGeom prst="rect">
@@ -20607,7 +20607,7 @@
         </p:nvSpPr>
         <p:spPr>
           <a:xfrm>
-            <a:off x="21022179" y="14064019"/>
+            <a:off x="20961565" y="14064019"/>
             <a:ext cx="5822950" cy="1938992"/>
           </a:xfrm>
           <a:prstGeom prst="rect">
@@ -27720,8 +27720,8 @@
           </p:graphicFrame>
         </mc:Fallback>
       </mc:AlternateContent>
-      <mc:AlternateContent xmlns:mc="http://schemas.openxmlformats.org/markup-compatibility/2006" xmlns:a14="http://schemas.microsoft.com/office/drawing/2010/main">
-        <mc:Choice Requires="a14">
+      <mc:AlternateContent xmlns:mc="http://schemas.openxmlformats.org/markup-compatibility/2006">
+        <mc:Choice xmlns:a14="http://schemas.microsoft.com/office/drawing/2010/main" Requires="a14">
           <p:graphicFrame>
             <p:nvGraphicFramePr>
               <p:cNvPr id="218" name="Table 217">
@@ -27735,11 +27735,15 @@
                 <a:graphicFrameLocks noGrp="1"/>
               </p:cNvGraphicFramePr>
               <p:nvPr>
-                <p:extLst/>
+                <p:extLst>
+                  <p:ext uri="{D42A27DB-BD31-4B8C-83A1-F6EECF244321}">
+                    <p14:modId xmlns:p14="http://schemas.microsoft.com/office/powerpoint/2010/main" val="2127935766"/>
+                  </p:ext>
+                </p:extLst>
               </p:nvPr>
             </p:nvGraphicFramePr>
             <p:xfrm>
-              <a:off x="10389650" y="14173200"/>
+              <a:off x="10421182" y="14173200"/>
               <a:ext cx="2889755" cy="1772055"/>
             </p:xfrm>
             <a:graphic>
@@ -29104,7 +29108,7 @@
             </a:graphic>
           </p:graphicFrame>
         </mc:Choice>
-        <mc:Fallback xmlns="">
+        <mc:Fallback>
           <p:graphicFrame>
             <p:nvGraphicFramePr>
               <p:cNvPr id="218" name="Table 217">
@@ -29120,13 +29124,13 @@
               <p:nvPr>
                 <p:extLst>
                   <p:ext uri="{D42A27DB-BD31-4B8C-83A1-F6EECF244321}">
-                    <p14:modId xmlns:p14="http://schemas.microsoft.com/office/powerpoint/2010/main" val="2520771329"/>
+                    <p14:modId xmlns:p14="http://schemas.microsoft.com/office/powerpoint/2010/main" val="2127935766"/>
                   </p:ext>
                 </p:extLst>
               </p:nvPr>
             </p:nvGraphicFramePr>
             <p:xfrm>
-              <a:off x="10389650" y="14173200"/>
+              <a:off x="10421182" y="14173200"/>
               <a:ext cx="2889755" cy="1772055"/>
             </p:xfrm>
             <a:graphic>
@@ -34459,7 +34463,7 @@
               <a:rPr lang="en-US" sz="1800" dirty="0">
                 <a:latin typeface="Oxygen" panose="02000503000000000000" pitchFamily="2" charset="0"/>
               </a:rPr>
-              <a:t> results for sample of held-out images in validation set, shown alongside original ground truth. Model was trained for 100 epochs (equivalent to 227,500) iterations), using a batch size of 16.</a:t>
+              <a:t> results for sample of held-out images in validation set, shown alongside original ground truth. Model was trained for 100 epochs (equivalent to 227,500 iterations), using a batch size of 16.</a:t>
             </a:r>
           </a:p>
         </p:txBody>

</xml_diff>